<commit_message>
updated project 1 power point
</commit_message>
<xml_diff>
--- a/Project 1/project1 power point.pptx
+++ b/Project 1/project1 power point.pptx
@@ -10607,7 +10607,38 @@
               </a:rPr>
               <a:t> a complete set of CRUD (Create, Read, Update, Delete) operations for managing books, users, and orders.</a:t>
             </a:r>
-            <a:endParaRPr i="0" sz="2400" u="none" cap="none" strike="noStrike">
+            <a:endParaRPr sz="2400">
+              <a:solidFill>
+                <a:schemeClr val="dk1"/>
+              </a:solidFill>
+            </a:endParaRPr>
+          </a:p>
+          <a:p>
+            <a:pPr indent="-343080" lvl="0" marL="343080" marR="0" rtl="0" algn="l">
+              <a:lnSpc>
+                <a:spcPct val="100000"/>
+              </a:lnSpc>
+              <a:spcBef>
+                <a:spcPts val="2183"/>
+              </a:spcBef>
+              <a:spcAft>
+                <a:spcPts val="0"/>
+              </a:spcAft>
+              <a:buClr>
+                <a:schemeClr val="dk1"/>
+              </a:buClr>
+              <a:buSzPts val="2400"/>
+              <a:buChar char="•"/>
+            </a:pPr>
+            <a:r>
+              <a:rPr lang="en-US" sz="2400">
+                <a:solidFill>
+                  <a:schemeClr val="dk1"/>
+                </a:solidFill>
+              </a:rPr>
+              <a:t>Uses AWS to host the database.</a:t>
+            </a:r>
+            <a:endParaRPr sz="2400">
               <a:solidFill>
                 <a:schemeClr val="dk1"/>
               </a:solidFill>
@@ -12250,7 +12281,7 @@
                   <a:schemeClr val="dk1"/>
                 </a:solidFill>
               </a:rPr>
-              <a:t> Log Out</a:t>
+              <a:t>Log Out</a:t>
             </a:r>
             <a:endParaRPr sz="1700">
               <a:solidFill>
@@ -12854,9 +12885,9 @@
 </file>
 
 <file path=ppt/theme/theme1.xml><?xml version="1.0" encoding="utf-8"?>
-<a:theme xmlns:a="http://schemas.openxmlformats.org/drawingml/2006/main" xmlns:r="http://schemas.openxmlformats.org/officeDocument/2006/relationships" name="Office Theme">
+<a:theme xmlns:a="http://schemas.openxmlformats.org/drawingml/2006/main" xmlns:r="http://schemas.openxmlformats.org/officeDocument/2006/relationships">
   <a:themeElements>
-    <a:clrScheme name="Office">
+    <a:clrScheme name="Default">
       <a:dk1>
         <a:srgbClr val="000000"/>
       </a:dk1>
@@ -12864,34 +12895,34 @@
         <a:srgbClr val="FFFFFF"/>
       </a:lt1>
       <a:dk2>
-        <a:srgbClr val="1F497D"/>
+        <a:srgbClr val="158158"/>
       </a:dk2>
       <a:lt2>
-        <a:srgbClr val="EEECE1"/>
+        <a:srgbClr val="F3F3F3"/>
       </a:lt2>
       <a:accent1>
-        <a:srgbClr val="4F81BD"/>
+        <a:srgbClr val="058DC7"/>
       </a:accent1>
       <a:accent2>
-        <a:srgbClr val="C0504D"/>
+        <a:srgbClr val="50B432"/>
       </a:accent2>
       <a:accent3>
-        <a:srgbClr val="9BBB59"/>
+        <a:srgbClr val="ED561B"/>
       </a:accent3>
       <a:accent4>
-        <a:srgbClr val="8064A2"/>
+        <a:srgbClr val="EDEF00"/>
       </a:accent4>
       <a:accent5>
-        <a:srgbClr val="4BACC6"/>
+        <a:srgbClr val="24CBE5"/>
       </a:accent5>
       <a:accent6>
-        <a:srgbClr val="F79646"/>
+        <a:srgbClr val="64E572"/>
       </a:accent6>
       <a:hlink>
-        <a:srgbClr val="0000FF"/>
+        <a:srgbClr val="2200CC"/>
       </a:hlink>
       <a:folHlink>
-        <a:srgbClr val="800080"/>
+        <a:srgbClr val="551A8B"/>
       </a:folHlink>
     </a:clrScheme>
     <a:fontScheme name="Office">
@@ -13691,9 +13722,9 @@
 </file>
 
 <file path=ppt/theme/theme4.xml><?xml version="1.0" encoding="utf-8"?>
-<a:theme xmlns:a="http://schemas.openxmlformats.org/drawingml/2006/main" xmlns:r="http://schemas.openxmlformats.org/officeDocument/2006/relationships">
+<a:theme xmlns:a="http://schemas.openxmlformats.org/drawingml/2006/main" xmlns:r="http://schemas.openxmlformats.org/officeDocument/2006/relationships" name="Office Theme">
   <a:themeElements>
-    <a:clrScheme name="Default">
+    <a:clrScheme name="Office">
       <a:dk1>
         <a:srgbClr val="000000"/>
       </a:dk1>
@@ -13701,34 +13732,34 @@
         <a:srgbClr val="FFFFFF"/>
       </a:lt1>
       <a:dk2>
-        <a:srgbClr val="158158"/>
+        <a:srgbClr val="1F497D"/>
       </a:dk2>
       <a:lt2>
-        <a:srgbClr val="F3F3F3"/>
+        <a:srgbClr val="EEECE1"/>
       </a:lt2>
       <a:accent1>
-        <a:srgbClr val="058DC7"/>
+        <a:srgbClr val="4F81BD"/>
       </a:accent1>
       <a:accent2>
-        <a:srgbClr val="50B432"/>
+        <a:srgbClr val="C0504D"/>
       </a:accent2>
       <a:accent3>
-        <a:srgbClr val="ED561B"/>
+        <a:srgbClr val="9BBB59"/>
       </a:accent3>
       <a:accent4>
-        <a:srgbClr val="EDEF00"/>
+        <a:srgbClr val="8064A2"/>
       </a:accent4>
       <a:accent5>
-        <a:srgbClr val="24CBE5"/>
+        <a:srgbClr val="4BACC6"/>
       </a:accent5>
       <a:accent6>
-        <a:srgbClr val="64E572"/>
+        <a:srgbClr val="F79646"/>
       </a:accent6>
       <a:hlink>
-        <a:srgbClr val="2200CC"/>
+        <a:srgbClr val="0000FF"/>
       </a:hlink>
       <a:folHlink>
-        <a:srgbClr val="551A8B"/>
+        <a:srgbClr val="800080"/>
       </a:folHlink>
     </a:clrScheme>
     <a:fontScheme name="Office">

</xml_diff>